<commit_message>
Caso de Uso + Modelo Concentual + Modelo Lógico + Físico(banco)
</commit_message>
<xml_diff>
--- a/Caso de Uso + Modelo Conceitual + Modelo Lógico.pptx
+++ b/Caso de Uso + Modelo Conceitual + Modelo Lógico.pptx
@@ -261,7 +261,7 @@
           <a:p>
             <a:fld id="{C5F732A2-6935-4CCB-AA9B-5926B416FF46}" type="datetimeFigureOut">
               <a:rPr lang="pt-BR" smtClean="0"/>
-              <a:t>01/11/2021</a:t>
+              <a:t>02/11/2021</a:t>
             </a:fld>
             <a:endParaRPr lang="pt-BR"/>
           </a:p>
@@ -459,7 +459,7 @@
           <a:p>
             <a:fld id="{C5F732A2-6935-4CCB-AA9B-5926B416FF46}" type="datetimeFigureOut">
               <a:rPr lang="pt-BR" smtClean="0"/>
-              <a:t>01/11/2021</a:t>
+              <a:t>02/11/2021</a:t>
             </a:fld>
             <a:endParaRPr lang="pt-BR"/>
           </a:p>
@@ -667,7 +667,7 @@
           <a:p>
             <a:fld id="{C5F732A2-6935-4CCB-AA9B-5926B416FF46}" type="datetimeFigureOut">
               <a:rPr lang="pt-BR" smtClean="0"/>
-              <a:t>01/11/2021</a:t>
+              <a:t>02/11/2021</a:t>
             </a:fld>
             <a:endParaRPr lang="pt-BR"/>
           </a:p>
@@ -865,7 +865,7 @@
           <a:p>
             <a:fld id="{C5F732A2-6935-4CCB-AA9B-5926B416FF46}" type="datetimeFigureOut">
               <a:rPr lang="pt-BR" smtClean="0"/>
-              <a:t>01/11/2021</a:t>
+              <a:t>02/11/2021</a:t>
             </a:fld>
             <a:endParaRPr lang="pt-BR"/>
           </a:p>
@@ -1140,7 +1140,7 @@
           <a:p>
             <a:fld id="{C5F732A2-6935-4CCB-AA9B-5926B416FF46}" type="datetimeFigureOut">
               <a:rPr lang="pt-BR" smtClean="0"/>
-              <a:t>01/11/2021</a:t>
+              <a:t>02/11/2021</a:t>
             </a:fld>
             <a:endParaRPr lang="pt-BR"/>
           </a:p>
@@ -1405,7 +1405,7 @@
           <a:p>
             <a:fld id="{C5F732A2-6935-4CCB-AA9B-5926B416FF46}" type="datetimeFigureOut">
               <a:rPr lang="pt-BR" smtClean="0"/>
-              <a:t>01/11/2021</a:t>
+              <a:t>02/11/2021</a:t>
             </a:fld>
             <a:endParaRPr lang="pt-BR"/>
           </a:p>
@@ -1817,7 +1817,7 @@
           <a:p>
             <a:fld id="{C5F732A2-6935-4CCB-AA9B-5926B416FF46}" type="datetimeFigureOut">
               <a:rPr lang="pt-BR" smtClean="0"/>
-              <a:t>01/11/2021</a:t>
+              <a:t>02/11/2021</a:t>
             </a:fld>
             <a:endParaRPr lang="pt-BR"/>
           </a:p>
@@ -1958,7 +1958,7 @@
           <a:p>
             <a:fld id="{C5F732A2-6935-4CCB-AA9B-5926B416FF46}" type="datetimeFigureOut">
               <a:rPr lang="pt-BR" smtClean="0"/>
-              <a:t>01/11/2021</a:t>
+              <a:t>02/11/2021</a:t>
             </a:fld>
             <a:endParaRPr lang="pt-BR"/>
           </a:p>
@@ -2071,7 +2071,7 @@
           <a:p>
             <a:fld id="{C5F732A2-6935-4CCB-AA9B-5926B416FF46}" type="datetimeFigureOut">
               <a:rPr lang="pt-BR" smtClean="0"/>
-              <a:t>01/11/2021</a:t>
+              <a:t>02/11/2021</a:t>
             </a:fld>
             <a:endParaRPr lang="pt-BR"/>
           </a:p>
@@ -2382,7 +2382,7 @@
           <a:p>
             <a:fld id="{C5F732A2-6935-4CCB-AA9B-5926B416FF46}" type="datetimeFigureOut">
               <a:rPr lang="pt-BR" smtClean="0"/>
-              <a:t>01/11/2021</a:t>
+              <a:t>02/11/2021</a:t>
             </a:fld>
             <a:endParaRPr lang="pt-BR"/>
           </a:p>
@@ -2670,7 +2670,7 @@
           <a:p>
             <a:fld id="{C5F732A2-6935-4CCB-AA9B-5926B416FF46}" type="datetimeFigureOut">
               <a:rPr lang="pt-BR" smtClean="0"/>
-              <a:t>01/11/2021</a:t>
+              <a:t>02/11/2021</a:t>
             </a:fld>
             <a:endParaRPr lang="pt-BR"/>
           </a:p>
@@ -2911,7 +2911,7 @@
           <a:p>
             <a:fld id="{C5F732A2-6935-4CCB-AA9B-5926B416FF46}" type="datetimeFigureOut">
               <a:rPr lang="pt-BR" smtClean="0"/>
-              <a:t>01/11/2021</a:t>
+              <a:t>02/11/2021</a:t>
             </a:fld>
             <a:endParaRPr lang="pt-BR"/>
           </a:p>
@@ -4980,7 +4980,7 @@
           <p:nvPr>
             <p:extLst>
               <p:ext uri="{D42A27DB-BD31-4B8C-83A1-F6EECF244321}">
-                <p14:modId xmlns:p14="http://schemas.microsoft.com/office/powerpoint/2010/main" val="2095286122"/>
+                <p14:modId xmlns:p14="http://schemas.microsoft.com/office/powerpoint/2010/main" val="2265459811"/>
               </p:ext>
             </p:extLst>
           </p:nvPr>
@@ -5092,7 +5092,7 @@
                     <a:p>
                       <a:r>
                         <a:rPr lang="pt-BR" dirty="0"/>
-                        <a:t>VALOR_PROD DOUBLE</a:t>
+                        <a:t>VALOR_PROD FLOAT</a:t>
                       </a:r>
                     </a:p>
                   </a:txBody>
@@ -5123,7 +5123,7 @@
           <p:nvPr>
             <p:extLst>
               <p:ext uri="{D42A27DB-BD31-4B8C-83A1-F6EECF244321}">
-                <p14:modId xmlns:p14="http://schemas.microsoft.com/office/powerpoint/2010/main" val="1976587120"/>
+                <p14:modId xmlns:p14="http://schemas.microsoft.com/office/powerpoint/2010/main" val="4252157269"/>
               </p:ext>
             </p:extLst>
           </p:nvPr>
@@ -5195,8 +5195,13 @@
                     <a:p>
                       <a:r>
                         <a:rPr lang="pt-BR" dirty="0"/>
-                        <a:t>VALOR_ VENDA DOUBLE</a:t>
+                        <a:t>VALOR_ </a:t>
                       </a:r>
+                      <a:r>
+                        <a:rPr lang="pt-BR"/>
+                        <a:t>VENDA FLOAT</a:t>
+                      </a:r>
+                      <a:endParaRPr lang="pt-BR" dirty="0"/>
                     </a:p>
                   </a:txBody>
                   <a:tcPr/>

</xml_diff>